<commit_message>
small update of presentation-2
</commit_message>
<xml_diff>
--- a/presentations/Presentation-2.pptx
+++ b/presentations/Presentation-2.pptx
@@ -111,7 +111,7 @@
   </p:defaultTextStyle>
   <p:extLst>
     <p:ext uri="{EFAFB233-063F-42B5-8137-9DF3F51BA10A}">
-      <p15:sldGuideLst xmlns="" xmlns:p15="http://schemas.microsoft.com/office/powerpoint/2012/main"/>
+      <p15:sldGuideLst xmlns:p15="http://schemas.microsoft.com/office/powerpoint/2012/main" xmlns=""/>
     </p:ext>
   </p:extLst>
 </p:presentation>
@@ -3034,11 +3034,7 @@
           <a:p>
             <a:r>
               <a:rPr lang="de-AT" dirty="0" smtClean="0"/>
-              <a:t>Group </a:t>
-            </a:r>
-            <a:r>
-              <a:rPr lang="de-AT" dirty="0" smtClean="0"/>
-              <a:t>4</a:t>
+              <a:t>Group 4</a:t>
             </a:r>
           </a:p>
           <a:p>
@@ -4961,8 +4957,33 @@
             <a:pPr lvl="1"/>
             <a:r>
               <a:rPr lang="en-US" dirty="0"/>
-              <a:t>Creates a new VM for each received request</a:t>
-            </a:r>
+              <a:t>Creates a new VM for each received </a:t>
+            </a:r>
+            <a:r>
+              <a:rPr lang="en-US" dirty="0" smtClean="0"/>
+              <a:t>request</a:t>
+            </a:r>
+          </a:p>
+          <a:p>
+            <a:r>
+              <a:rPr lang="en-US" dirty="0" smtClean="0"/>
+              <a:t>VM</a:t>
+            </a:r>
+          </a:p>
+          <a:p>
+            <a:pPr lvl="1"/>
+            <a:r>
+              <a:rPr lang="en-US" dirty="0" smtClean="0"/>
+              <a:t>Runs the user’s application</a:t>
+            </a:r>
+          </a:p>
+          <a:p>
+            <a:pPr lvl="1"/>
+            <a:r>
+              <a:rPr lang="en-US" dirty="0" smtClean="0"/>
+              <a:t>Consumes resources from PM</a:t>
+            </a:r>
+            <a:endParaRPr lang="en-US" dirty="0"/>
           </a:p>
           <a:p>
             <a:pPr marL="0" indent="0">
@@ -5240,7 +5261,7 @@
   <a:extraClrSchemeLst/>
   <a:extLst>
     <a:ext uri="{05A4C25C-085E-4340-85A3-A5531E510DB2}">
-      <thm15:themeFamily xmlns="" xmlns:thm15="http://schemas.microsoft.com/office/thememl/2012/main" name="Office Theme" id="{62F939B6-93AF-4DB8-9C6B-D6C7DFDC589F}" vid="{4A3C46E8-61CC-4603-A589-7422A47A8E4A}"/>
+      <thm15:themeFamily xmlns:thm15="http://schemas.microsoft.com/office/thememl/2012/main" xmlns="" name="Office Theme" id="{62F939B6-93AF-4DB8-9C6B-D6C7DFDC589F}" vid="{4A3C46E8-61CC-4603-A589-7422A47A8E4A}"/>
     </a:ext>
   </a:extLst>
 </a:theme>

</xml_diff>